<commit_message>
Fix minor spelling errors
</commit_message>
<xml_diff>
--- a/FINAL_Referat_BWP_FINAL.pptx
+++ b/FINAL_Referat_BWP_FINAL.pptx
@@ -9572,7 +9572,7 @@
         <p:spPr>
           <a:xfrm>
             <a:off x="0" y="4824360"/>
-            <a:ext cx="9139320" cy="314280"/>
+            <a:ext cx="9138960" cy="313920"/>
           </a:xfrm>
           <a:prstGeom prst="rect">
             <a:avLst/>
@@ -9608,7 +9608,7 @@
         <p:spPr>
           <a:xfrm>
             <a:off x="8714160" y="4897080"/>
-            <a:ext cx="187200" cy="187200"/>
+            <a:ext cx="186840" cy="186840"/>
           </a:xfrm>
           <a:prstGeom prst="ellipse">
             <a:avLst/>
@@ -9644,7 +9644,7 @@
                 <a:spcPct val="100000"/>
               </a:lnSpc>
             </a:pPr>
-            <a:fld id="{55E09089-A314-4B62-B410-655E5B1EEC4B}" type="slidenum">
+            <a:fld id="{01C431C3-FE28-43EB-9028-7E3EA12D27D7}" type="slidenum">
               <a:rPr b="0" lang="de-DE" sz="680" spc="-1" strike="noStrike">
                 <a:solidFill>
                   <a:srgbClr val="02d35f"/>
@@ -9673,7 +9673,7 @@
         <p:spPr>
           <a:xfrm>
             <a:off x="0" y="0"/>
-            <a:ext cx="9139320" cy="5138640"/>
+            <a:ext cx="9138960" cy="5138280"/>
           </a:xfrm>
           <a:prstGeom prst="rect">
             <a:avLst/>
@@ -9696,7 +9696,7 @@
         <p:spPr>
           <a:xfrm>
             <a:off x="7395120" y="486360"/>
-            <a:ext cx="872640" cy="528480"/>
+            <a:ext cx="872280" cy="528120"/>
           </a:xfrm>
           <a:prstGeom prst="rect">
             <a:avLst/>
@@ -9975,7 +9975,7 @@
         <p:spPr>
           <a:xfrm>
             <a:off x="0" y="4824360"/>
-            <a:ext cx="9139320" cy="314280"/>
+            <a:ext cx="9138960" cy="313920"/>
           </a:xfrm>
           <a:prstGeom prst="rect">
             <a:avLst/>
@@ -10036,7 +10036,7 @@
         <p:spPr>
           <a:xfrm>
             <a:off x="8714160" y="4897080"/>
-            <a:ext cx="187200" cy="187200"/>
+            <a:ext cx="186840" cy="186840"/>
           </a:xfrm>
           <a:prstGeom prst="ellipse">
             <a:avLst/>
@@ -10072,7 +10072,7 @@
                 <a:spcPct val="100000"/>
               </a:lnSpc>
             </a:pPr>
-            <a:fld id="{A4CCDE49-BC10-4CFE-A0E3-443B465FA9DD}" type="slidenum">
+            <a:fld id="{C84F05BB-C775-4920-BFE9-D48AAE14C65B}" type="slidenum">
               <a:rPr b="0" lang="de-DE" sz="680" spc="-1" strike="noStrike">
                 <a:solidFill>
                   <a:srgbClr val="02d35f"/>
@@ -10357,7 +10357,7 @@
         <p:spPr>
           <a:xfrm>
             <a:off x="0" y="4824360"/>
-            <a:ext cx="9141120" cy="316080"/>
+            <a:ext cx="9140760" cy="315720"/>
           </a:xfrm>
           <a:prstGeom prst="rect">
             <a:avLst/>
@@ -10385,7 +10385,7 @@
         <p:spPr>
           <a:xfrm>
             <a:off x="8714160" y="4897080"/>
-            <a:ext cx="189000" cy="189000"/>
+            <a:ext cx="188640" cy="188640"/>
           </a:xfrm>
           <a:prstGeom prst="ellipse">
             <a:avLst/>
@@ -10413,7 +10413,7 @@
                 <a:spcPct val="100000"/>
               </a:lnSpc>
             </a:pPr>
-            <a:fld id="{C388F2F6-E870-4EFA-9D62-42C535BF2FFF}" type="slidenum">
+            <a:fld id="{D2221B07-3BB9-4ECD-B8DB-69975C425445}" type="slidenum">
               <a:rPr b="0" lang="de-DE" sz="680" spc="-1" strike="noStrike">
                 <a:solidFill>
                   <a:srgbClr val="02d35f"/>
@@ -10876,7 +10876,7 @@
         <p:spPr>
           <a:xfrm>
             <a:off x="0" y="4824360"/>
-            <a:ext cx="9141120" cy="316080"/>
+            <a:ext cx="9140760" cy="315720"/>
           </a:xfrm>
           <a:prstGeom prst="rect">
             <a:avLst/>
@@ -10904,7 +10904,7 @@
         <p:spPr>
           <a:xfrm>
             <a:off x="8714160" y="4897080"/>
-            <a:ext cx="189000" cy="189000"/>
+            <a:ext cx="188640" cy="188640"/>
           </a:xfrm>
           <a:prstGeom prst="ellipse">
             <a:avLst/>
@@ -10932,7 +10932,7 @@
                 <a:spcPct val="100000"/>
               </a:lnSpc>
             </a:pPr>
-            <a:fld id="{5EF5E56C-D2E0-42DC-B474-2E511E76963A}" type="slidenum">
+            <a:fld id="{09C2C262-8EF6-4274-B59E-937540AD88FC}" type="slidenum">
               <a:rPr b="0" lang="de-DE" sz="680" spc="-1" strike="noStrike">
                 <a:solidFill>
                   <a:srgbClr val="02d35f"/>
@@ -11217,7 +11217,7 @@
         <p:spPr>
           <a:xfrm>
             <a:off x="0" y="4824360"/>
-            <a:ext cx="9141120" cy="316080"/>
+            <a:ext cx="9140760" cy="315720"/>
           </a:xfrm>
           <a:prstGeom prst="rect">
             <a:avLst/>
@@ -11245,7 +11245,7 @@
         <p:spPr>
           <a:xfrm>
             <a:off x="8714160" y="4897080"/>
-            <a:ext cx="189000" cy="189000"/>
+            <a:ext cx="188640" cy="188640"/>
           </a:xfrm>
           <a:prstGeom prst="ellipse">
             <a:avLst/>
@@ -11273,7 +11273,7 @@
                 <a:spcPct val="100000"/>
               </a:lnSpc>
             </a:pPr>
-            <a:fld id="{C86F00CC-D619-49EE-BEB7-8F8A91933723}" type="slidenum">
+            <a:fld id="{9F9DA988-153D-4112-B3EA-DC901E7FB31E}" type="slidenum">
               <a:rPr b="0" lang="de-DE" sz="680" spc="-1" strike="noStrike">
                 <a:solidFill>
                   <a:srgbClr val="02d35f"/>
@@ -11736,7 +11736,7 @@
         <p:spPr>
           <a:xfrm>
             <a:off x="0" y="4824360"/>
-            <a:ext cx="9141120" cy="316080"/>
+            <a:ext cx="9140760" cy="315720"/>
           </a:xfrm>
           <a:prstGeom prst="rect">
             <a:avLst/>
@@ -11764,7 +11764,7 @@
         <p:spPr>
           <a:xfrm>
             <a:off x="8714160" y="4897080"/>
-            <a:ext cx="189000" cy="189000"/>
+            <a:ext cx="188640" cy="188640"/>
           </a:xfrm>
           <a:prstGeom prst="ellipse">
             <a:avLst/>
@@ -11792,7 +11792,7 @@
                 <a:spcPct val="100000"/>
               </a:lnSpc>
             </a:pPr>
-            <a:fld id="{56057BC2-F9A8-4678-A9D5-D2A008657360}" type="slidenum">
+            <a:fld id="{AAF6ECF6-3194-4F1E-A1B9-E9BB6D64A8BA}" type="slidenum">
               <a:rPr b="0" lang="de-DE" sz="680" spc="-1" strike="noStrike">
                 <a:solidFill>
                   <a:srgbClr val="02d35f"/>
@@ -12077,7 +12077,7 @@
         <p:spPr>
           <a:xfrm>
             <a:off x="0" y="4824360"/>
-            <a:ext cx="9138960" cy="313920"/>
+            <a:ext cx="9138600" cy="313560"/>
           </a:xfrm>
           <a:prstGeom prst="rect">
             <a:avLst/>
@@ -12138,7 +12138,7 @@
         <p:spPr>
           <a:xfrm>
             <a:off x="8714160" y="4897080"/>
-            <a:ext cx="186840" cy="186840"/>
+            <a:ext cx="186480" cy="186480"/>
           </a:xfrm>
           <a:prstGeom prst="ellipse">
             <a:avLst/>
@@ -12174,7 +12174,7 @@
                 <a:spcPct val="100000"/>
               </a:lnSpc>
             </a:pPr>
-            <a:fld id="{96B61344-64AD-46D0-BC7E-367A10AF6A36}" type="slidenum">
+            <a:fld id="{C51C9F92-BD06-4446-9D24-1B630E774A95}" type="slidenum">
               <a:rPr b="0" lang="de-DE" sz="680" spc="-1" strike="noStrike">
                 <a:solidFill>
                   <a:srgbClr val="02d35f"/>
@@ -12452,7 +12452,7 @@
         <p:spPr>
           <a:xfrm>
             <a:off x="867960" y="1080360"/>
-            <a:ext cx="7399800" cy="1785960"/>
+            <a:ext cx="7399440" cy="1785600"/>
           </a:xfrm>
           <a:prstGeom prst="rect">
             <a:avLst/>
@@ -12503,7 +12503,7 @@
         <p:spPr>
           <a:xfrm>
             <a:off x="867960" y="2926800"/>
-            <a:ext cx="7399800" cy="785880"/>
+            <a:ext cx="7399440" cy="785520"/>
           </a:xfrm>
           <a:prstGeom prst="rect">
             <a:avLst/>
@@ -12584,7 +12584,7 @@
         <p:spPr>
           <a:xfrm>
             <a:off x="867960" y="4218840"/>
-            <a:ext cx="3249360" cy="677160"/>
+            <a:ext cx="3249000" cy="676800"/>
           </a:xfrm>
           <a:prstGeom prst="rect">
             <a:avLst/>
@@ -12661,7 +12661,7 @@
         <p:spPr>
           <a:xfrm>
             <a:off x="7223760" y="274320"/>
-            <a:ext cx="1277640" cy="820440"/>
+            <a:ext cx="1277280" cy="820080"/>
           </a:xfrm>
           <a:prstGeom prst="rect">
             <a:avLst/>
@@ -12721,7 +12721,7 @@
         <p:spPr>
           <a:xfrm>
             <a:off x="457200" y="205200"/>
-            <a:ext cx="8227800" cy="857160"/>
+            <a:ext cx="8227440" cy="856800"/>
           </a:xfrm>
           <a:prstGeom prst="rect">
             <a:avLst/>
@@ -12776,7 +12776,7 @@
         <p:spPr>
           <a:xfrm>
             <a:off x="5256000" y="1211040"/>
-            <a:ext cx="3870360" cy="2915640"/>
+            <a:ext cx="3870000" cy="2915280"/>
           </a:xfrm>
           <a:prstGeom prst="rect">
             <a:avLst/>
@@ -12795,7 +12795,7 @@
         <p:spPr>
           <a:xfrm>
             <a:off x="376200" y="1193040"/>
-            <a:ext cx="4734360" cy="2981520"/>
+            <a:ext cx="4734000" cy="2981160"/>
           </a:xfrm>
           <a:prstGeom prst="rect">
             <a:avLst/>
@@ -12816,7 +12816,7 @@
             <a:normAutofit/>
           </a:bodyPr>
           <a:p>
-            <a:pPr marL="432000" indent="-322560">
+            <a:pPr marL="432000" indent="-322200">
               <a:lnSpc>
                 <a:spcPct val="100000"/>
               </a:lnSpc>
@@ -12855,7 +12855,7 @@
         <p:spPr>
           <a:xfrm>
             <a:off x="360000" y="4248000"/>
-            <a:ext cx="8638920" cy="345240"/>
+            <a:ext cx="8638560" cy="344880"/>
           </a:xfrm>
           <a:prstGeom prst="rect">
             <a:avLst/>
@@ -13170,7 +13170,7 @@
         <p:spPr>
           <a:xfrm>
             <a:off x="874800" y="343080"/>
-            <a:ext cx="7961760" cy="581400"/>
+            <a:ext cx="7961400" cy="581040"/>
           </a:xfrm>
           <a:prstGeom prst="rect">
             <a:avLst/>
@@ -13196,7 +13196,7 @@
         <p:spPr>
           <a:xfrm>
             <a:off x="874800" y="1428480"/>
-            <a:ext cx="7961760" cy="3180240"/>
+            <a:ext cx="7961400" cy="3179880"/>
           </a:xfrm>
           <a:prstGeom prst="rect">
             <a:avLst/>
@@ -13222,7 +13222,7 @@
         <p:spPr>
           <a:xfrm>
             <a:off x="874800" y="343080"/>
-            <a:ext cx="7961760" cy="581400"/>
+            <a:ext cx="7961400" cy="581040"/>
           </a:xfrm>
           <a:prstGeom prst="rect">
             <a:avLst/>
@@ -13273,7 +13273,7 @@
         <p:spPr>
           <a:xfrm>
             <a:off x="822960" y="1188720"/>
-            <a:ext cx="7130160" cy="3580200"/>
+            <a:ext cx="7129800" cy="3579840"/>
           </a:xfrm>
           <a:prstGeom prst="rect">
             <a:avLst/>
@@ -13307,7 +13307,7 @@
                 <a:latin typeface="Arial"/>
                 <a:ea typeface="Droid Sans Fallback"/>
               </a:rPr>
-              <a:t>-Abschluss eines Gesellschaftsvertrages zwischen Komplementär und Kommandisten</a:t>
+              <a:t>-Abschluss eines Gesellschaftsvertrages zwischen Komplementär und Kommanditisten</a:t>
             </a:r>
             <a:endParaRPr b="0" lang="de-DE" sz="1800" spc="-1" strike="noStrike">
               <a:latin typeface="Arial"/>
@@ -13454,7 +13454,7 @@
         <p:spPr>
           <a:xfrm>
             <a:off x="874800" y="343080"/>
-            <a:ext cx="7961760" cy="581400"/>
+            <a:ext cx="7961400" cy="581040"/>
           </a:xfrm>
           <a:prstGeom prst="rect">
             <a:avLst/>
@@ -13480,7 +13480,7 @@
         <p:spPr>
           <a:xfrm>
             <a:off x="874800" y="1428480"/>
-            <a:ext cx="7961760" cy="3180240"/>
+            <a:ext cx="7961400" cy="3179880"/>
           </a:xfrm>
           <a:prstGeom prst="rect">
             <a:avLst/>
@@ -13506,7 +13506,7 @@
         <p:spPr>
           <a:xfrm>
             <a:off x="874800" y="343080"/>
-            <a:ext cx="7961760" cy="581400"/>
+            <a:ext cx="7961400" cy="581040"/>
           </a:xfrm>
           <a:prstGeom prst="rect">
             <a:avLst/>
@@ -13557,7 +13557,7 @@
         <p:spPr>
           <a:xfrm>
             <a:off x="822960" y="1188720"/>
-            <a:ext cx="7130160" cy="3580200"/>
+            <a:ext cx="7129800" cy="3579840"/>
           </a:xfrm>
           <a:prstGeom prst="rect">
             <a:avLst/>
@@ -13768,7 +13768,7 @@
         <p:spPr>
           <a:xfrm>
             <a:off x="874800" y="343080"/>
-            <a:ext cx="7960680" cy="580320"/>
+            <a:ext cx="7960320" cy="579960"/>
           </a:xfrm>
           <a:prstGeom prst="rect">
             <a:avLst/>
@@ -13794,7 +13794,7 @@
         <p:spPr>
           <a:xfrm>
             <a:off x="874800" y="1428480"/>
-            <a:ext cx="7960680" cy="3179160"/>
+            <a:ext cx="7960320" cy="3178800"/>
           </a:xfrm>
           <a:prstGeom prst="rect">
             <a:avLst/>
@@ -13820,7 +13820,7 @@
         <p:spPr>
           <a:xfrm>
             <a:off x="874800" y="343080"/>
-            <a:ext cx="7960680" cy="580320"/>
+            <a:ext cx="7960320" cy="579960"/>
           </a:xfrm>
           <a:prstGeom prst="rect">
             <a:avLst/>
@@ -13871,7 +13871,7 @@
         <p:spPr>
           <a:xfrm>
             <a:off x="822960" y="1188720"/>
-            <a:ext cx="7129080" cy="3579120"/>
+            <a:ext cx="7128720" cy="3578760"/>
           </a:xfrm>
           <a:prstGeom prst="rect">
             <a:avLst/>
@@ -13892,7 +13892,7 @@
             <a:noAutofit/>
           </a:bodyPr>
           <a:p>
-            <a:pPr marL="216000" indent="-215280">
+            <a:pPr marL="216000" indent="-214920">
               <a:lnSpc>
                 <a:spcPct val="100000"/>
               </a:lnSpc>
@@ -13923,7 +13923,7 @@
             </a:endParaRPr>
           </a:p>
           <a:p>
-            <a:pPr marL="216000" indent="-215280">
+            <a:pPr marL="216000" indent="-214920">
               <a:lnSpc>
                 <a:spcPct val="100000"/>
               </a:lnSpc>
@@ -13954,7 +13954,7 @@
             </a:endParaRPr>
           </a:p>
           <a:p>
-            <a:pPr marL="216000" indent="-215280">
+            <a:pPr marL="216000" indent="-214920">
               <a:lnSpc>
                 <a:spcPct val="100000"/>
               </a:lnSpc>
@@ -14242,7 +14242,7 @@
         <p:spPr>
           <a:xfrm>
             <a:off x="874800" y="343080"/>
-            <a:ext cx="7960680" cy="580320"/>
+            <a:ext cx="7960320" cy="579960"/>
           </a:xfrm>
           <a:prstGeom prst="rect">
             <a:avLst/>
@@ -14268,7 +14268,7 @@
         <p:spPr>
           <a:xfrm>
             <a:off x="874800" y="1381680"/>
-            <a:ext cx="3891600" cy="3277800"/>
+            <a:ext cx="3891240" cy="3277440"/>
           </a:xfrm>
           <a:prstGeom prst="rect">
             <a:avLst/>
@@ -14294,7 +14294,7 @@
         <p:spPr>
           <a:xfrm>
             <a:off x="874800" y="990360"/>
-            <a:ext cx="3891600" cy="323280"/>
+            <a:ext cx="3891240" cy="322920"/>
           </a:xfrm>
           <a:prstGeom prst="rect">
             <a:avLst/>
@@ -14320,7 +14320,7 @@
         <p:spPr>
           <a:xfrm>
             <a:off x="4943520" y="1382400"/>
-            <a:ext cx="3895200" cy="3277800"/>
+            <a:ext cx="3894840" cy="3277440"/>
           </a:xfrm>
           <a:prstGeom prst="rect">
             <a:avLst/>
@@ -14346,7 +14346,7 @@
         <p:spPr>
           <a:xfrm>
             <a:off x="4943520" y="990360"/>
-            <a:ext cx="3895200" cy="323280"/>
+            <a:ext cx="3894840" cy="322920"/>
           </a:xfrm>
           <a:prstGeom prst="rect">
             <a:avLst/>
@@ -14372,7 +14372,7 @@
         <p:spPr>
           <a:xfrm>
             <a:off x="874800" y="343080"/>
-            <a:ext cx="7960680" cy="580320"/>
+            <a:ext cx="7960320" cy="579960"/>
           </a:xfrm>
           <a:prstGeom prst="rect">
             <a:avLst/>
@@ -14423,7 +14423,7 @@
         <p:spPr>
           <a:xfrm>
             <a:off x="822960" y="1188720"/>
-            <a:ext cx="7129080" cy="3158640"/>
+            <a:ext cx="7128720" cy="3158280"/>
           </a:xfrm>
           <a:prstGeom prst="rect">
             <a:avLst/>
@@ -14444,7 +14444,7 @@
             <a:noAutofit/>
           </a:bodyPr>
           <a:p>
-            <a:pPr marL="216000" indent="-215280">
+            <a:pPr marL="216000" indent="-214920">
               <a:lnSpc>
                 <a:spcPct val="100000"/>
               </a:lnSpc>
@@ -14475,7 +14475,7 @@
             </a:endParaRPr>
           </a:p>
           <a:p>
-            <a:pPr marL="216000" indent="-215280">
+            <a:pPr marL="216000" indent="-214920">
               <a:lnSpc>
                 <a:spcPct val="100000"/>
               </a:lnSpc>
@@ -14506,7 +14506,7 @@
             </a:endParaRPr>
           </a:p>
           <a:p>
-            <a:pPr lvl="1" marL="432000" indent="-215280">
+            <a:pPr lvl="1" marL="432000" indent="-214920">
               <a:lnSpc>
                 <a:spcPct val="100000"/>
               </a:lnSpc>
@@ -14538,7 +14538,7 @@
             </a:endParaRPr>
           </a:p>
           <a:p>
-            <a:pPr lvl="1" marL="432000" indent="-215280">
+            <a:pPr lvl="1" marL="432000" indent="-214920">
               <a:lnSpc>
                 <a:spcPct val="100000"/>
               </a:lnSpc>
@@ -14570,7 +14570,7 @@
             </a:endParaRPr>
           </a:p>
           <a:p>
-            <a:pPr marL="216000" indent="-215280">
+            <a:pPr marL="216000" indent="-214920">
               <a:lnSpc>
                 <a:spcPct val="100000"/>
               </a:lnSpc>
@@ -14601,7 +14601,7 @@
             </a:endParaRPr>
           </a:p>
           <a:p>
-            <a:pPr lvl="1" marL="432000" indent="-215280">
+            <a:pPr lvl="1" marL="432000" indent="-214920">
               <a:lnSpc>
                 <a:spcPct val="100000"/>
               </a:lnSpc>
@@ -14970,7 +14970,7 @@
         <p:spPr>
           <a:xfrm>
             <a:off x="874800" y="343080"/>
-            <a:ext cx="7960680" cy="580320"/>
+            <a:ext cx="7960320" cy="579960"/>
           </a:xfrm>
           <a:prstGeom prst="rect">
             <a:avLst/>
@@ -14996,7 +14996,7 @@
         <p:spPr>
           <a:xfrm>
             <a:off x="874800" y="1381680"/>
-            <a:ext cx="3891600" cy="3277800"/>
+            <a:ext cx="3891240" cy="3277440"/>
           </a:xfrm>
           <a:prstGeom prst="rect">
             <a:avLst/>
@@ -15022,7 +15022,7 @@
         <p:spPr>
           <a:xfrm>
             <a:off x="874800" y="990360"/>
-            <a:ext cx="3891600" cy="323280"/>
+            <a:ext cx="3891240" cy="322920"/>
           </a:xfrm>
           <a:prstGeom prst="rect">
             <a:avLst/>
@@ -15048,7 +15048,7 @@
         <p:spPr>
           <a:xfrm>
             <a:off x="4943520" y="1382400"/>
-            <a:ext cx="3895200" cy="3277800"/>
+            <a:ext cx="3894840" cy="3277440"/>
           </a:xfrm>
           <a:prstGeom prst="rect">
             <a:avLst/>
@@ -15074,7 +15074,7 @@
         <p:spPr>
           <a:xfrm>
             <a:off x="4943520" y="990360"/>
-            <a:ext cx="3895200" cy="323280"/>
+            <a:ext cx="3894840" cy="322920"/>
           </a:xfrm>
           <a:prstGeom prst="rect">
             <a:avLst/>
@@ -15100,7 +15100,7 @@
         <p:spPr>
           <a:xfrm>
             <a:off x="874800" y="343080"/>
-            <a:ext cx="7960680" cy="580320"/>
+            <a:ext cx="7960320" cy="579960"/>
           </a:xfrm>
           <a:prstGeom prst="rect">
             <a:avLst/>
@@ -15151,7 +15151,7 @@
         <p:spPr>
           <a:xfrm>
             <a:off x="822960" y="1188720"/>
-            <a:ext cx="7129080" cy="3139200"/>
+            <a:ext cx="7128720" cy="3138840"/>
           </a:xfrm>
           <a:prstGeom prst="rect">
             <a:avLst/>
@@ -15172,7 +15172,7 @@
             <a:noAutofit/>
           </a:bodyPr>
           <a:p>
-            <a:pPr marL="216000" indent="-215280">
+            <a:pPr marL="216000" indent="-214920">
               <a:lnSpc>
                 <a:spcPct val="100000"/>
               </a:lnSpc>
@@ -15203,7 +15203,7 @@
             </a:endParaRPr>
           </a:p>
           <a:p>
-            <a:pPr lvl="1" marL="432000" indent="-215280">
+            <a:pPr lvl="1" marL="432000" indent="-214920">
               <a:lnSpc>
                 <a:spcPct val="100000"/>
               </a:lnSpc>
@@ -15235,7 +15235,7 @@
             </a:endParaRPr>
           </a:p>
           <a:p>
-            <a:pPr lvl="1" marL="432000" indent="-215280">
+            <a:pPr lvl="1" marL="432000" indent="-214920">
               <a:lnSpc>
                 <a:spcPct val="100000"/>
               </a:lnSpc>
@@ -15515,7 +15515,7 @@
         <p:spPr>
           <a:xfrm>
             <a:off x="874800" y="343080"/>
-            <a:ext cx="7961040" cy="580680"/>
+            <a:ext cx="7960680" cy="580320"/>
           </a:xfrm>
           <a:prstGeom prst="rect">
             <a:avLst/>
@@ -15541,7 +15541,7 @@
         <p:spPr>
           <a:xfrm>
             <a:off x="874800" y="1428480"/>
-            <a:ext cx="7961040" cy="3179520"/>
+            <a:ext cx="7960680" cy="3179160"/>
           </a:xfrm>
           <a:prstGeom prst="rect">
             <a:avLst/>
@@ -15567,7 +15567,7 @@
         <p:spPr>
           <a:xfrm>
             <a:off x="874800" y="343080"/>
-            <a:ext cx="7961040" cy="580680"/>
+            <a:ext cx="7960680" cy="580320"/>
           </a:xfrm>
           <a:prstGeom prst="rect">
             <a:avLst/>
@@ -15618,7 +15618,7 @@
         <p:spPr>
           <a:xfrm>
             <a:off x="822960" y="1028520"/>
-            <a:ext cx="7129440" cy="3579480"/>
+            <a:ext cx="7129080" cy="3579120"/>
           </a:xfrm>
           <a:prstGeom prst="rect">
             <a:avLst/>
@@ -16069,7 +16069,7 @@
         <p:spPr>
           <a:xfrm>
             <a:off x="720000" y="426240"/>
-            <a:ext cx="7961040" cy="580680"/>
+            <a:ext cx="7960680" cy="580320"/>
           </a:xfrm>
           <a:prstGeom prst="rect">
             <a:avLst/>
@@ -16095,7 +16095,7 @@
         <p:spPr>
           <a:xfrm>
             <a:off x="720000" y="1211400"/>
-            <a:ext cx="7961040" cy="3179520"/>
+            <a:ext cx="7960680" cy="3179160"/>
           </a:xfrm>
           <a:prstGeom prst="rect">
             <a:avLst/>
@@ -16121,7 +16121,7 @@
         <p:spPr>
           <a:xfrm>
             <a:off x="864000" y="354240"/>
-            <a:ext cx="7961040" cy="580680"/>
+            <a:ext cx="7960680" cy="580320"/>
           </a:xfrm>
           <a:prstGeom prst="rect">
             <a:avLst/>
@@ -16172,7 +16172,7 @@
         <p:spPr>
           <a:xfrm>
             <a:off x="789840" y="1099800"/>
-            <a:ext cx="7129440" cy="3579480"/>
+            <a:ext cx="7129080" cy="3579120"/>
           </a:xfrm>
           <a:prstGeom prst="rect">
             <a:avLst/>
@@ -16483,7 +16483,7 @@
         <p:spPr>
           <a:xfrm>
             <a:off x="720000" y="426240"/>
-            <a:ext cx="7961040" cy="580680"/>
+            <a:ext cx="7960680" cy="580320"/>
           </a:xfrm>
           <a:prstGeom prst="rect">
             <a:avLst/>
@@ -16509,7 +16509,7 @@
         <p:spPr>
           <a:xfrm>
             <a:off x="720000" y="1211400"/>
-            <a:ext cx="7961040" cy="3179520"/>
+            <a:ext cx="7960680" cy="3179160"/>
           </a:xfrm>
           <a:prstGeom prst="rect">
             <a:avLst/>
@@ -16535,7 +16535,7 @@
         <p:spPr>
           <a:xfrm>
             <a:off x="864000" y="354240"/>
-            <a:ext cx="7961040" cy="580680"/>
+            <a:ext cx="7960680" cy="580320"/>
           </a:xfrm>
           <a:prstGeom prst="rect">
             <a:avLst/>
@@ -16596,7 +16596,7 @@
         <p:spPr>
           <a:xfrm>
             <a:off x="822960" y="1188720"/>
-            <a:ext cx="7129440" cy="3579480"/>
+            <a:ext cx="7129080" cy="3579120"/>
           </a:xfrm>
           <a:prstGeom prst="rect">
             <a:avLst/>
@@ -17027,7 +17027,7 @@
         <p:spPr>
           <a:xfrm>
             <a:off x="720000" y="426240"/>
-            <a:ext cx="7961040" cy="580680"/>
+            <a:ext cx="7960680" cy="580320"/>
           </a:xfrm>
           <a:prstGeom prst="rect">
             <a:avLst/>
@@ -17053,7 +17053,7 @@
         <p:spPr>
           <a:xfrm>
             <a:off x="720000" y="1211400"/>
-            <a:ext cx="7961040" cy="3179520"/>
+            <a:ext cx="7960680" cy="3179160"/>
           </a:xfrm>
           <a:prstGeom prst="rect">
             <a:avLst/>
@@ -17079,7 +17079,7 @@
         <p:spPr>
           <a:xfrm>
             <a:off x="864000" y="354240"/>
-            <a:ext cx="7961040" cy="580680"/>
+            <a:ext cx="7960680" cy="580320"/>
           </a:xfrm>
           <a:prstGeom prst="rect">
             <a:avLst/>
@@ -17140,7 +17140,7 @@
         <p:spPr>
           <a:xfrm>
             <a:off x="822960" y="1188720"/>
-            <a:ext cx="7129440" cy="3579480"/>
+            <a:ext cx="7129080" cy="3579120"/>
           </a:xfrm>
           <a:prstGeom prst="rect">
             <a:avLst/>
@@ -17441,7 +17441,7 @@
         <p:spPr>
           <a:xfrm>
             <a:off x="874800" y="343080"/>
-            <a:ext cx="7963200" cy="582840"/>
+            <a:ext cx="7962840" cy="582480"/>
           </a:xfrm>
           <a:prstGeom prst="rect">
             <a:avLst/>
@@ -17492,7 +17492,7 @@
         <p:spPr>
           <a:xfrm>
             <a:off x="874800" y="937080"/>
-            <a:ext cx="7963200" cy="438840"/>
+            <a:ext cx="7962840" cy="438480"/>
           </a:xfrm>
           <a:prstGeom prst="rect">
             <a:avLst/>
@@ -17546,7 +17546,7 @@
         <p:spPr>
           <a:xfrm>
             <a:off x="874800" y="1428480"/>
-            <a:ext cx="7963200" cy="3181680"/>
+            <a:ext cx="7962840" cy="3181320"/>
           </a:xfrm>
           <a:prstGeom prst="rect">
             <a:avLst/>
@@ -17771,7 +17771,7 @@
         <p:spPr>
           <a:xfrm>
             <a:off x="874800" y="343080"/>
-            <a:ext cx="7961040" cy="580680"/>
+            <a:ext cx="7960680" cy="580320"/>
           </a:xfrm>
           <a:prstGeom prst="rect">
             <a:avLst/>
@@ -17797,7 +17797,7 @@
         <p:spPr>
           <a:xfrm>
             <a:off x="874800" y="1428480"/>
-            <a:ext cx="7961040" cy="3179520"/>
+            <a:ext cx="7960680" cy="3179160"/>
           </a:xfrm>
           <a:prstGeom prst="rect">
             <a:avLst/>
@@ -17823,7 +17823,7 @@
         <p:spPr>
           <a:xfrm>
             <a:off x="874800" y="343080"/>
-            <a:ext cx="7961040" cy="580680"/>
+            <a:ext cx="7960680" cy="580320"/>
           </a:xfrm>
           <a:prstGeom prst="rect">
             <a:avLst/>
@@ -17874,7 +17874,7 @@
         <p:spPr>
           <a:xfrm>
             <a:off x="822960" y="1188720"/>
-            <a:ext cx="7129440" cy="3579480"/>
+            <a:ext cx="7129080" cy="3579120"/>
           </a:xfrm>
           <a:prstGeom prst="rect">
             <a:avLst/>
@@ -18520,7 +18520,7 @@
         <p:spPr>
           <a:xfrm>
             <a:off x="874800" y="343080"/>
-            <a:ext cx="7961040" cy="580680"/>
+            <a:ext cx="7960680" cy="580320"/>
           </a:xfrm>
           <a:prstGeom prst="rect">
             <a:avLst/>
@@ -18546,7 +18546,7 @@
         <p:spPr>
           <a:xfrm>
             <a:off x="874800" y="1381680"/>
-            <a:ext cx="3891960" cy="3278160"/>
+            <a:ext cx="3891600" cy="3277800"/>
           </a:xfrm>
           <a:prstGeom prst="rect">
             <a:avLst/>
@@ -18572,7 +18572,7 @@
         <p:spPr>
           <a:xfrm>
             <a:off x="874800" y="990360"/>
-            <a:ext cx="3891960" cy="323640"/>
+            <a:ext cx="3891600" cy="323280"/>
           </a:xfrm>
           <a:prstGeom prst="rect">
             <a:avLst/>
@@ -18598,7 +18598,7 @@
         <p:spPr>
           <a:xfrm>
             <a:off x="4943520" y="1382400"/>
-            <a:ext cx="3895560" cy="3278160"/>
+            <a:ext cx="3895200" cy="3277800"/>
           </a:xfrm>
           <a:prstGeom prst="rect">
             <a:avLst/>
@@ -18624,7 +18624,7 @@
         <p:spPr>
           <a:xfrm>
             <a:off x="4943520" y="990360"/>
-            <a:ext cx="3895560" cy="323640"/>
+            <a:ext cx="3895200" cy="323280"/>
           </a:xfrm>
           <a:prstGeom prst="rect">
             <a:avLst/>
@@ -18650,7 +18650,7 @@
         <p:spPr>
           <a:xfrm>
             <a:off x="874800" y="343080"/>
-            <a:ext cx="7961040" cy="580680"/>
+            <a:ext cx="7960680" cy="580320"/>
           </a:xfrm>
           <a:prstGeom prst="rect">
             <a:avLst/>
@@ -18701,7 +18701,7 @@
         <p:spPr>
           <a:xfrm>
             <a:off x="822960" y="1188720"/>
-            <a:ext cx="7129440" cy="3159000"/>
+            <a:ext cx="7129080" cy="3158640"/>
           </a:xfrm>
           <a:prstGeom prst="rect">
             <a:avLst/>
@@ -19317,7 +19317,7 @@
         <p:spPr>
           <a:xfrm>
             <a:off x="874800" y="343080"/>
-            <a:ext cx="7961040" cy="580680"/>
+            <a:ext cx="7960680" cy="580320"/>
           </a:xfrm>
           <a:prstGeom prst="rect">
             <a:avLst/>
@@ -19343,7 +19343,7 @@
         <p:spPr>
           <a:xfrm>
             <a:off x="874800" y="1381680"/>
-            <a:ext cx="3891960" cy="3278160"/>
+            <a:ext cx="3891600" cy="3277800"/>
           </a:xfrm>
           <a:prstGeom prst="rect">
             <a:avLst/>
@@ -19369,7 +19369,7 @@
         <p:spPr>
           <a:xfrm>
             <a:off x="874800" y="990360"/>
-            <a:ext cx="3891960" cy="323640"/>
+            <a:ext cx="3891600" cy="323280"/>
           </a:xfrm>
           <a:prstGeom prst="rect">
             <a:avLst/>
@@ -19395,7 +19395,7 @@
         <p:spPr>
           <a:xfrm>
             <a:off x="4943520" y="1382400"/>
-            <a:ext cx="3895560" cy="3278160"/>
+            <a:ext cx="3895200" cy="3277800"/>
           </a:xfrm>
           <a:prstGeom prst="rect">
             <a:avLst/>
@@ -19421,7 +19421,7 @@
         <p:spPr>
           <a:xfrm>
             <a:off x="4943520" y="990360"/>
-            <a:ext cx="3895560" cy="323640"/>
+            <a:ext cx="3895200" cy="323280"/>
           </a:xfrm>
           <a:prstGeom prst="rect">
             <a:avLst/>
@@ -19447,7 +19447,7 @@
         <p:spPr>
           <a:xfrm>
             <a:off x="874800" y="343080"/>
-            <a:ext cx="7961040" cy="580680"/>
+            <a:ext cx="7960680" cy="580320"/>
           </a:xfrm>
           <a:prstGeom prst="rect">
             <a:avLst/>
@@ -19498,7 +19498,7 @@
         <p:spPr>
           <a:xfrm>
             <a:off x="822960" y="1188720"/>
-            <a:ext cx="7129440" cy="3139560"/>
+            <a:ext cx="7129080" cy="3139200"/>
           </a:xfrm>
           <a:prstGeom prst="rect">
             <a:avLst/>
@@ -20093,7 +20093,7 @@
         <p:spPr>
           <a:xfrm>
             <a:off x="874800" y="343080"/>
-            <a:ext cx="7961040" cy="580680"/>
+            <a:ext cx="7960680" cy="580320"/>
           </a:xfrm>
           <a:prstGeom prst="rect">
             <a:avLst/>
@@ -20119,7 +20119,7 @@
         <p:spPr>
           <a:xfrm>
             <a:off x="874800" y="1381680"/>
-            <a:ext cx="3891960" cy="3278160"/>
+            <a:ext cx="3891600" cy="3277800"/>
           </a:xfrm>
           <a:prstGeom prst="rect">
             <a:avLst/>
@@ -20145,7 +20145,7 @@
         <p:spPr>
           <a:xfrm>
             <a:off x="874800" y="990360"/>
-            <a:ext cx="3891960" cy="323640"/>
+            <a:ext cx="3891600" cy="323280"/>
           </a:xfrm>
           <a:prstGeom prst="rect">
             <a:avLst/>
@@ -20171,7 +20171,7 @@
         <p:spPr>
           <a:xfrm>
             <a:off x="4943520" y="1382400"/>
-            <a:ext cx="3895560" cy="3278160"/>
+            <a:ext cx="3895200" cy="3277800"/>
           </a:xfrm>
           <a:prstGeom prst="rect">
             <a:avLst/>
@@ -20197,7 +20197,7 @@
         <p:spPr>
           <a:xfrm>
             <a:off x="4943520" y="990360"/>
-            <a:ext cx="3895560" cy="323640"/>
+            <a:ext cx="3895200" cy="323280"/>
           </a:xfrm>
           <a:prstGeom prst="rect">
             <a:avLst/>
@@ -20223,7 +20223,7 @@
         <p:spPr>
           <a:xfrm>
             <a:off x="874800" y="343080"/>
-            <a:ext cx="7961040" cy="580680"/>
+            <a:ext cx="7960680" cy="580320"/>
           </a:xfrm>
           <a:prstGeom prst="rect">
             <a:avLst/>
@@ -20274,7 +20274,7 @@
         <p:spPr>
           <a:xfrm>
             <a:off x="822960" y="1188720"/>
-            <a:ext cx="7129440" cy="2701800"/>
+            <a:ext cx="7129080" cy="2701440"/>
           </a:xfrm>
           <a:prstGeom prst="rect">
             <a:avLst/>
@@ -20481,7 +20481,7 @@
         <p:spPr>
           <a:xfrm>
             <a:off x="930960" y="2952000"/>
-            <a:ext cx="399240" cy="214560"/>
+            <a:ext cx="398880" cy="214200"/>
           </a:xfrm>
           <a:custGeom>
             <a:avLst/>
@@ -20887,7 +20887,7 @@
         <p:spPr>
           <a:xfrm>
             <a:off x="874800" y="343080"/>
-            <a:ext cx="7961040" cy="580680"/>
+            <a:ext cx="7960680" cy="580320"/>
           </a:xfrm>
           <a:prstGeom prst="rect">
             <a:avLst/>
@@ -20913,7 +20913,7 @@
         <p:spPr>
           <a:xfrm>
             <a:off x="874800" y="1381680"/>
-            <a:ext cx="3891960" cy="3278160"/>
+            <a:ext cx="3891600" cy="3277800"/>
           </a:xfrm>
           <a:prstGeom prst="rect">
             <a:avLst/>
@@ -20939,7 +20939,7 @@
         <p:spPr>
           <a:xfrm>
             <a:off x="874800" y="990360"/>
-            <a:ext cx="3891960" cy="323640"/>
+            <a:ext cx="3891600" cy="323280"/>
           </a:xfrm>
           <a:prstGeom prst="rect">
             <a:avLst/>
@@ -20965,7 +20965,7 @@
         <p:spPr>
           <a:xfrm>
             <a:off x="4943520" y="1382400"/>
-            <a:ext cx="3895560" cy="3278160"/>
+            <a:ext cx="3895200" cy="3277800"/>
           </a:xfrm>
           <a:prstGeom prst="rect">
             <a:avLst/>
@@ -20991,7 +20991,7 @@
         <p:spPr>
           <a:xfrm>
             <a:off x="4943520" y="990360"/>
-            <a:ext cx="3895560" cy="323640"/>
+            <a:ext cx="3895200" cy="323280"/>
           </a:xfrm>
           <a:prstGeom prst="rect">
             <a:avLst/>
@@ -21017,7 +21017,7 @@
         <p:spPr>
           <a:xfrm>
             <a:off x="874800" y="343080"/>
-            <a:ext cx="7961040" cy="580680"/>
+            <a:ext cx="7960680" cy="580320"/>
           </a:xfrm>
           <a:prstGeom prst="rect">
             <a:avLst/>
@@ -21068,7 +21068,7 @@
         <p:spPr>
           <a:xfrm>
             <a:off x="822960" y="1188720"/>
-            <a:ext cx="7129440" cy="2647080"/>
+            <a:ext cx="7129080" cy="2646720"/>
           </a:xfrm>
           <a:prstGeom prst="rect">
             <a:avLst/>
@@ -21553,7 +21553,7 @@
         <p:spPr>
           <a:xfrm>
             <a:off x="874800" y="343080"/>
-            <a:ext cx="7961040" cy="580680"/>
+            <a:ext cx="7960680" cy="580320"/>
           </a:xfrm>
           <a:prstGeom prst="rect">
             <a:avLst/>
@@ -21579,7 +21579,7 @@
         <p:spPr>
           <a:xfrm>
             <a:off x="874800" y="1381680"/>
-            <a:ext cx="3891960" cy="3278160"/>
+            <a:ext cx="3891600" cy="3277800"/>
           </a:xfrm>
           <a:prstGeom prst="rect">
             <a:avLst/>
@@ -21605,7 +21605,7 @@
         <p:spPr>
           <a:xfrm>
             <a:off x="874800" y="990360"/>
-            <a:ext cx="3891960" cy="323640"/>
+            <a:ext cx="3891600" cy="323280"/>
           </a:xfrm>
           <a:prstGeom prst="rect">
             <a:avLst/>
@@ -21631,7 +21631,7 @@
         <p:spPr>
           <a:xfrm>
             <a:off x="4943520" y="1382400"/>
-            <a:ext cx="3895560" cy="3278160"/>
+            <a:ext cx="3895200" cy="3277800"/>
           </a:xfrm>
           <a:prstGeom prst="rect">
             <a:avLst/>
@@ -21657,7 +21657,7 @@
         <p:spPr>
           <a:xfrm>
             <a:off x="4943520" y="990360"/>
-            <a:ext cx="3895560" cy="323640"/>
+            <a:ext cx="3895200" cy="323280"/>
           </a:xfrm>
           <a:prstGeom prst="rect">
             <a:avLst/>
@@ -21683,7 +21683,7 @@
         <p:spPr>
           <a:xfrm>
             <a:off x="874800" y="343080"/>
-            <a:ext cx="7961040" cy="580680"/>
+            <a:ext cx="7960680" cy="580320"/>
           </a:xfrm>
           <a:prstGeom prst="rect">
             <a:avLst/>
@@ -21734,7 +21734,7 @@
         <p:spPr>
           <a:xfrm>
             <a:off x="822960" y="1188720"/>
-            <a:ext cx="7129440" cy="1879200"/>
+            <a:ext cx="7129080" cy="1878840"/>
           </a:xfrm>
           <a:prstGeom prst="rect">
             <a:avLst/>
@@ -21995,7 +21995,7 @@
         <p:spPr>
           <a:xfrm>
             <a:off x="1008000" y="3456000"/>
-            <a:ext cx="563400" cy="214200"/>
+            <a:ext cx="563040" cy="213840"/>
           </a:xfrm>
           <a:custGeom>
             <a:avLst/>
@@ -22056,7 +22056,7 @@
         <p:spPr>
           <a:xfrm>
             <a:off x="1728000" y="3384000"/>
-            <a:ext cx="4030560" cy="344880"/>
+            <a:ext cx="4030200" cy="344520"/>
           </a:xfrm>
           <a:prstGeom prst="rect">
             <a:avLst/>
@@ -22137,7 +22137,7 @@
         <p:spPr>
           <a:xfrm>
             <a:off x="457200" y="205200"/>
-            <a:ext cx="8228160" cy="857520"/>
+            <a:ext cx="8227800" cy="857160"/>
           </a:xfrm>
           <a:prstGeom prst="rect">
             <a:avLst/>
@@ -22192,7 +22192,7 @@
         <p:spPr>
           <a:xfrm>
             <a:off x="1928880" y="1071720"/>
-            <a:ext cx="5283720" cy="2070720"/>
+            <a:ext cx="5283360" cy="2070360"/>
           </a:xfrm>
           <a:prstGeom prst="rect">
             <a:avLst/>
@@ -22211,7 +22211,7 @@
         <p:spPr>
           <a:xfrm>
             <a:off x="0" y="3429000"/>
-            <a:ext cx="9000000" cy="1186920"/>
+            <a:ext cx="8999640" cy="1186920"/>
           </a:xfrm>
           <a:prstGeom prst="rect">
             <a:avLst/>
@@ -22252,7 +22252,7 @@
             </a:endParaRPr>
           </a:p>
           <a:p>
-            <a:pPr marL="216000" indent="-215280">
+            <a:pPr marL="216000" indent="-214920">
               <a:lnSpc>
                 <a:spcPct val="100000"/>
               </a:lnSpc>
@@ -22287,7 +22287,7 @@
             </a:endParaRPr>
           </a:p>
           <a:p>
-            <a:pPr marL="216000" indent="-215280">
+            <a:pPr marL="216000" indent="-214920">
               <a:lnSpc>
                 <a:spcPct val="100000"/>
               </a:lnSpc>
@@ -22322,7 +22322,7 @@
             </a:endParaRPr>
           </a:p>
           <a:p>
-            <a:pPr marL="216000" indent="-215280">
+            <a:pPr marL="216000" indent="-214920">
               <a:lnSpc>
                 <a:spcPct val="100000"/>
               </a:lnSpc>
@@ -22566,7 +22566,7 @@
         <p:spPr>
           <a:xfrm>
             <a:off x="3500280" y="142920"/>
-            <a:ext cx="2284920" cy="894960"/>
+            <a:ext cx="2284560" cy="894600"/>
           </a:xfrm>
           <a:prstGeom prst="rect">
             <a:avLst/>
@@ -22585,7 +22585,7 @@
         <p:spPr>
           <a:xfrm>
             <a:off x="0" y="1143000"/>
-            <a:ext cx="9142920" cy="2009880"/>
+            <a:ext cx="9142560" cy="2009880"/>
           </a:xfrm>
           <a:prstGeom prst="rect">
             <a:avLst/>
@@ -22756,7 +22756,7 @@
         <p:spPr>
           <a:xfrm>
             <a:off x="0" y="3000240"/>
-            <a:ext cx="9142920" cy="1461240"/>
+            <a:ext cx="9142560" cy="1461240"/>
           </a:xfrm>
           <a:prstGeom prst="rect">
             <a:avLst/>
@@ -23021,7 +23021,7 @@
         <p:spPr>
           <a:xfrm>
             <a:off x="3500280" y="142920"/>
-            <a:ext cx="2284920" cy="894960"/>
+            <a:ext cx="2284560" cy="894600"/>
           </a:xfrm>
           <a:prstGeom prst="rect">
             <a:avLst/>
@@ -23040,7 +23040,7 @@
         <p:spPr>
           <a:xfrm>
             <a:off x="822960" y="1188720"/>
-            <a:ext cx="7129440" cy="2701800"/>
+            <a:ext cx="7129080" cy="2701440"/>
           </a:xfrm>
           <a:prstGeom prst="rect">
             <a:avLst/>
@@ -23551,7 +23551,7 @@
         <p:spPr>
           <a:xfrm>
             <a:off x="3500280" y="142920"/>
-            <a:ext cx="2284920" cy="894960"/>
+            <a:ext cx="2284560" cy="894600"/>
           </a:xfrm>
           <a:prstGeom prst="rect">
             <a:avLst/>
@@ -23570,7 +23570,7 @@
         <p:spPr>
           <a:xfrm>
             <a:off x="822960" y="1188720"/>
-            <a:ext cx="8319960" cy="2647080"/>
+            <a:ext cx="8319600" cy="2646720"/>
           </a:xfrm>
           <a:prstGeom prst="rect">
             <a:avLst/>
@@ -24065,7 +24065,7 @@
         <p:spPr>
           <a:xfrm>
             <a:off x="874800" y="343080"/>
-            <a:ext cx="7963200" cy="582840"/>
+            <a:ext cx="7962840" cy="582480"/>
           </a:xfrm>
           <a:prstGeom prst="rect">
             <a:avLst/>
@@ -24116,7 +24116,7 @@
         <p:spPr>
           <a:xfrm>
             <a:off x="874800" y="937080"/>
-            <a:ext cx="7963200" cy="438840"/>
+            <a:ext cx="7962840" cy="438480"/>
           </a:xfrm>
           <a:prstGeom prst="rect">
             <a:avLst/>
@@ -24170,7 +24170,7 @@
         <p:spPr>
           <a:xfrm>
             <a:off x="874800" y="1428480"/>
-            <a:ext cx="7963200" cy="3181680"/>
+            <a:ext cx="7962840" cy="3181320"/>
           </a:xfrm>
           <a:prstGeom prst="rect">
             <a:avLst/>
@@ -24299,7 +24299,7 @@
                 <a:latin typeface="Arial"/>
                 <a:ea typeface="DejaVu Sans"/>
               </a:rPr>
-              <a:t>Beispiel: hoyer GmbH</a:t>
+              <a:t>Beispiel: hoyer GmbH &amp; Co. KG</a:t>
             </a:r>
             <a:endParaRPr b="0" lang="de-DE" sz="1800" spc="-1" strike="noStrike">
               <a:latin typeface="Arial"/>
@@ -24395,7 +24395,7 @@
         <p:spPr>
           <a:xfrm>
             <a:off x="874800" y="343080"/>
-            <a:ext cx="7959960" cy="579600"/>
+            <a:ext cx="7959600" cy="579240"/>
           </a:xfrm>
           <a:prstGeom prst="rect">
             <a:avLst/>
@@ -24421,7 +24421,7 @@
         <p:spPr>
           <a:xfrm>
             <a:off x="874800" y="1381680"/>
-            <a:ext cx="3890880" cy="3277080"/>
+            <a:ext cx="3890520" cy="3276720"/>
           </a:xfrm>
           <a:prstGeom prst="rect">
             <a:avLst/>
@@ -24447,7 +24447,7 @@
         <p:spPr>
           <a:xfrm>
             <a:off x="874800" y="990360"/>
-            <a:ext cx="3890880" cy="322560"/>
+            <a:ext cx="3890520" cy="322200"/>
           </a:xfrm>
           <a:prstGeom prst="rect">
             <a:avLst/>
@@ -24473,7 +24473,7 @@
         <p:spPr>
           <a:xfrm>
             <a:off x="4943520" y="1382400"/>
-            <a:ext cx="3894480" cy="3277080"/>
+            <a:ext cx="3894120" cy="3276720"/>
           </a:xfrm>
           <a:prstGeom prst="rect">
             <a:avLst/>
@@ -24499,7 +24499,7 @@
         <p:spPr>
           <a:xfrm>
             <a:off x="4943520" y="990360"/>
-            <a:ext cx="3894480" cy="322560"/>
+            <a:ext cx="3894120" cy="322200"/>
           </a:xfrm>
           <a:prstGeom prst="rect">
             <a:avLst/>
@@ -24525,7 +24525,7 @@
         <p:spPr>
           <a:xfrm>
             <a:off x="874800" y="343080"/>
-            <a:ext cx="7959960" cy="579600"/>
+            <a:ext cx="7959600" cy="579240"/>
           </a:xfrm>
           <a:prstGeom prst="rect">
             <a:avLst/>
@@ -24576,7 +24576,7 @@
         <p:spPr>
           <a:xfrm>
             <a:off x="792000" y="990360"/>
-            <a:ext cx="7128360" cy="3470040"/>
+            <a:ext cx="7128000" cy="3469680"/>
           </a:xfrm>
           <a:prstGeom prst="rect">
             <a:avLst/>
@@ -25042,7 +25042,7 @@
         <p:spPr>
           <a:xfrm>
             <a:off x="874800" y="343080"/>
-            <a:ext cx="7963200" cy="582840"/>
+            <a:ext cx="7962840" cy="582480"/>
           </a:xfrm>
           <a:prstGeom prst="rect">
             <a:avLst/>
@@ -25068,7 +25068,7 @@
         <p:spPr>
           <a:xfrm>
             <a:off x="874800" y="937080"/>
-            <a:ext cx="7963200" cy="438840"/>
+            <a:ext cx="7962840" cy="438480"/>
           </a:xfrm>
           <a:prstGeom prst="rect">
             <a:avLst/>
@@ -25094,7 +25094,7 @@
         <p:spPr>
           <a:xfrm>
             <a:off x="874800" y="1428480"/>
-            <a:ext cx="7963200" cy="3181680"/>
+            <a:ext cx="7962840" cy="3181320"/>
           </a:xfrm>
           <a:prstGeom prst="rect">
             <a:avLst/>
@@ -25120,7 +25120,7 @@
         <p:spPr>
           <a:xfrm>
             <a:off x="457200" y="205200"/>
-            <a:ext cx="8227800" cy="857160"/>
+            <a:ext cx="8227440" cy="856800"/>
           </a:xfrm>
           <a:prstGeom prst="rect">
             <a:avLst/>
@@ -25171,7 +25171,7 @@
         <p:spPr>
           <a:xfrm>
             <a:off x="457560" y="1080000"/>
-            <a:ext cx="8613000" cy="1544760"/>
+            <a:ext cx="8612640" cy="1544400"/>
           </a:xfrm>
           <a:prstGeom prst="rect">
             <a:avLst/>
@@ -25192,7 +25192,7 @@
             <a:normAutofit/>
           </a:bodyPr>
           <a:p>
-            <a:pPr marL="432000" indent="-322560">
+            <a:pPr marL="432000" indent="-322200">
               <a:lnSpc>
                 <a:spcPct val="100000"/>
               </a:lnSpc>
@@ -25231,7 +25231,7 @@
         <p:spPr>
           <a:xfrm>
             <a:off x="457200" y="2321280"/>
-            <a:ext cx="8227800" cy="1349280"/>
+            <a:ext cx="8227440" cy="1348920"/>
           </a:xfrm>
           <a:prstGeom prst="rect">
             <a:avLst/>
@@ -25252,7 +25252,7 @@
             <a:normAutofit/>
           </a:bodyPr>
           <a:p>
-            <a:pPr marL="432000" indent="-322560">
+            <a:pPr marL="432000" indent="-322200">
               <a:lnSpc>
                 <a:spcPct val="100000"/>
               </a:lnSpc>
@@ -25281,7 +25281,7 @@
             </a:endParaRPr>
           </a:p>
           <a:p>
-            <a:pPr marL="432000" indent="-322560">
+            <a:pPr marL="432000" indent="-322200">
               <a:lnSpc>
                 <a:spcPct val="100000"/>
               </a:lnSpc>
@@ -25630,7 +25630,7 @@
         <p:spPr>
           <a:xfrm>
             <a:off x="874800" y="343080"/>
-            <a:ext cx="7963200" cy="582840"/>
+            <a:ext cx="7962840" cy="582480"/>
           </a:xfrm>
           <a:prstGeom prst="rect">
             <a:avLst/>
@@ -25656,7 +25656,7 @@
         <p:spPr>
           <a:xfrm>
             <a:off x="874800" y="937080"/>
-            <a:ext cx="7963200" cy="438840"/>
+            <a:ext cx="7962840" cy="438480"/>
           </a:xfrm>
           <a:prstGeom prst="rect">
             <a:avLst/>
@@ -25682,7 +25682,7 @@
         <p:spPr>
           <a:xfrm>
             <a:off x="874800" y="1428480"/>
-            <a:ext cx="7963200" cy="3181680"/>
+            <a:ext cx="7962840" cy="3181320"/>
           </a:xfrm>
           <a:prstGeom prst="rect">
             <a:avLst/>
@@ -25708,7 +25708,7 @@
         <p:spPr>
           <a:xfrm>
             <a:off x="457200" y="205200"/>
-            <a:ext cx="8227800" cy="857160"/>
+            <a:ext cx="8227440" cy="856800"/>
           </a:xfrm>
           <a:prstGeom prst="rect">
             <a:avLst/>
@@ -25759,7 +25759,7 @@
         <p:spPr>
           <a:xfrm>
             <a:off x="288000" y="1224000"/>
-            <a:ext cx="8227800" cy="2981520"/>
+            <a:ext cx="8227440" cy="2981160"/>
           </a:xfrm>
           <a:prstGeom prst="rect">
             <a:avLst/>
@@ -26249,7 +26249,7 @@
         <p:spPr>
           <a:xfrm>
             <a:off x="457200" y="9360"/>
-            <a:ext cx="8227800" cy="1248840"/>
+            <a:ext cx="8227440" cy="1248480"/>
           </a:xfrm>
           <a:prstGeom prst="rect">
             <a:avLst/>
@@ -26300,7 +26300,7 @@
         <p:spPr>
           <a:xfrm>
             <a:off x="288000" y="2461680"/>
-            <a:ext cx="8566560" cy="344880"/>
+            <a:ext cx="8566200" cy="344520"/>
           </a:xfrm>
           <a:prstGeom prst="rect">
             <a:avLst/>
@@ -26622,7 +26622,7 @@
         <p:spPr>
           <a:xfrm>
             <a:off x="874800" y="343080"/>
-            <a:ext cx="7963200" cy="582840"/>
+            <a:ext cx="7962840" cy="582480"/>
           </a:xfrm>
           <a:prstGeom prst="rect">
             <a:avLst/>
@@ -26648,7 +26648,7 @@
         <p:spPr>
           <a:xfrm>
             <a:off x="874800" y="1381680"/>
-            <a:ext cx="3894120" cy="3280320"/>
+            <a:ext cx="3893760" cy="3279960"/>
           </a:xfrm>
           <a:prstGeom prst="rect">
             <a:avLst/>
@@ -26674,7 +26674,7 @@
         <p:spPr>
           <a:xfrm>
             <a:off x="874800" y="990360"/>
-            <a:ext cx="3894120" cy="325800"/>
+            <a:ext cx="3893760" cy="325440"/>
           </a:xfrm>
           <a:prstGeom prst="rect">
             <a:avLst/>
@@ -26700,7 +26700,7 @@
         <p:spPr>
           <a:xfrm>
             <a:off x="4943520" y="1382400"/>
-            <a:ext cx="3897720" cy="3280320"/>
+            <a:ext cx="3897360" cy="3279960"/>
           </a:xfrm>
           <a:prstGeom prst="rect">
             <a:avLst/>
@@ -26726,7 +26726,7 @@
         <p:spPr>
           <a:xfrm>
             <a:off x="4943520" y="990360"/>
-            <a:ext cx="3897720" cy="325800"/>
+            <a:ext cx="3897360" cy="325440"/>
           </a:xfrm>
           <a:prstGeom prst="rect">
             <a:avLst/>
@@ -26756,7 +26756,7 @@
         <p:spPr>
           <a:xfrm>
             <a:off x="0" y="0"/>
-            <a:ext cx="9142560" cy="4822560"/>
+            <a:ext cx="9142200" cy="4822200"/>
           </a:xfrm>
           <a:prstGeom prst="rect">
             <a:avLst/>
@@ -26926,7 +26926,7 @@
         <p:spPr>
           <a:xfrm>
             <a:off x="457200" y="205200"/>
-            <a:ext cx="8227800" cy="857160"/>
+            <a:ext cx="8227440" cy="856800"/>
           </a:xfrm>
           <a:prstGeom prst="rect">
             <a:avLst/>
@@ -26977,7 +26977,7 @@
         <p:spPr>
           <a:xfrm>
             <a:off x="457200" y="1203480"/>
-            <a:ext cx="8227800" cy="2981520"/>
+            <a:ext cx="8227440" cy="2981160"/>
           </a:xfrm>
           <a:prstGeom prst="rect">
             <a:avLst/>
@@ -26998,7 +26998,7 @@
             <a:normAutofit fontScale="47000"/>
           </a:bodyPr>
           <a:p>
-            <a:pPr marL="432000" indent="-322560">
+            <a:pPr marL="432000" indent="-322200">
               <a:lnSpc>
                 <a:spcPct val="100000"/>
               </a:lnSpc>
@@ -27027,7 +27027,7 @@
             </a:endParaRPr>
           </a:p>
           <a:p>
-            <a:pPr marL="432000" indent="-322560">
+            <a:pPr marL="432000" indent="-322200">
               <a:lnSpc>
                 <a:spcPct val="100000"/>
               </a:lnSpc>
@@ -27056,7 +27056,7 @@
             </a:endParaRPr>
           </a:p>
           <a:p>
-            <a:pPr marL="432000" indent="-322560">
+            <a:pPr marL="432000" indent="-322200">
               <a:lnSpc>
                 <a:spcPct val="100000"/>
               </a:lnSpc>
@@ -27085,7 +27085,7 @@
             </a:endParaRPr>
           </a:p>
           <a:p>
-            <a:pPr marL="432000" indent="-322560">
+            <a:pPr marL="432000" indent="-322200">
               <a:lnSpc>
                 <a:spcPct val="100000"/>
               </a:lnSpc>
@@ -27114,7 +27114,7 @@
             </a:endParaRPr>
           </a:p>
           <a:p>
-            <a:pPr marL="432000" indent="-322560">
+            <a:pPr marL="432000" indent="-322200">
               <a:lnSpc>
                 <a:spcPct val="100000"/>
               </a:lnSpc>
@@ -27618,7 +27618,7 @@
         <p:spPr>
           <a:xfrm>
             <a:off x="457200" y="205200"/>
-            <a:ext cx="8227800" cy="857160"/>
+            <a:ext cx="8227440" cy="856800"/>
           </a:xfrm>
           <a:prstGeom prst="rect">
             <a:avLst/>
@@ -27669,7 +27669,7 @@
         <p:spPr>
           <a:xfrm>
             <a:off x="88200" y="1249200"/>
-            <a:ext cx="4014360" cy="2889720"/>
+            <a:ext cx="4014000" cy="2889360"/>
           </a:xfrm>
           <a:prstGeom prst="rect">
             <a:avLst/>
@@ -27695,7 +27695,7 @@
         <p:spPr>
           <a:xfrm>
             <a:off x="4032000" y="1152000"/>
-            <a:ext cx="4894560" cy="2981520"/>
+            <a:ext cx="4894200" cy="2981160"/>
           </a:xfrm>
           <a:prstGeom prst="rect">
             <a:avLst/>
@@ -27716,7 +27716,7 @@
             <a:normAutofit/>
           </a:bodyPr>
           <a:p>
-            <a:pPr marL="432000" indent="-322560">
+            <a:pPr marL="432000" indent="-322200">
               <a:lnSpc>
                 <a:spcPct val="100000"/>
               </a:lnSpc>
@@ -27745,7 +27745,7 @@
             </a:endParaRPr>
           </a:p>
           <a:p>
-            <a:pPr marL="432000" indent="-322560">
+            <a:pPr marL="432000" indent="-322200">
               <a:lnSpc>
                 <a:spcPct val="100000"/>
               </a:lnSpc>
@@ -27788,7 +27788,7 @@
         <p:spPr>
           <a:xfrm>
             <a:off x="79200" y="1296000"/>
-            <a:ext cx="4023360" cy="2662560"/>
+            <a:ext cx="4023000" cy="2662200"/>
           </a:xfrm>
           <a:prstGeom prst="rect">
             <a:avLst/>

</xml_diff>